<commit_message>
CW2 installation PP done
</commit_message>
<xml_diff>
--- a/401_OperatingSystems/assignments/Windows Server 2022.pptx
+++ b/401_OperatingSystems/assignments/Windows Server 2022.pptx
@@ -13,6 +13,10 @@
     <p:sldId id="260" r:id="rId7"/>
     <p:sldId id="261" r:id="rId8"/>
     <p:sldId id="262" r:id="rId9"/>
+    <p:sldId id="264" r:id="rId10"/>
+    <p:sldId id="265" r:id="rId11"/>
+    <p:sldId id="266" r:id="rId12"/>
+    <p:sldId id="267" r:id="rId13"/>
   </p:sldIdLst>
   <p:sldSz cx="12192000" cy="6858000"/>
   <p:notesSz cx="6858000" cy="9144000"/>
@@ -111,6 +115,11 @@
       </a:defRPr>
     </a:lvl9pPr>
   </p:defaultTextStyle>
+  <p:extLst>
+    <p:ext uri="{EFAFB233-063F-42B5-8137-9DF3F51BA10A}">
+      <p15:sldGuideLst xmlns:p15="http://schemas.microsoft.com/office/powerpoint/2012/main"/>
+    </p:ext>
+  </p:extLst>
 </p:presentation>
 </file>
 
@@ -261,7 +270,7 @@
           <a:p>
             <a:fld id="{37FD576D-CDDB-4BE3-B24E-0913864BC877}" type="datetimeFigureOut">
               <a:rPr lang="en-GB" smtClean="0"/>
-              <a:t>16/07/2025</a:t>
+              <a:t>17/07/2025</a:t>
             </a:fld>
             <a:endParaRPr lang="en-GB"/>
           </a:p>
@@ -459,7 +468,7 @@
           <a:p>
             <a:fld id="{37FD576D-CDDB-4BE3-B24E-0913864BC877}" type="datetimeFigureOut">
               <a:rPr lang="en-GB" smtClean="0"/>
-              <a:t>16/07/2025</a:t>
+              <a:t>17/07/2025</a:t>
             </a:fld>
             <a:endParaRPr lang="en-GB"/>
           </a:p>
@@ -667,7 +676,7 @@
           <a:p>
             <a:fld id="{37FD576D-CDDB-4BE3-B24E-0913864BC877}" type="datetimeFigureOut">
               <a:rPr lang="en-GB" smtClean="0"/>
-              <a:t>16/07/2025</a:t>
+              <a:t>17/07/2025</a:t>
             </a:fld>
             <a:endParaRPr lang="en-GB"/>
           </a:p>
@@ -865,7 +874,7 @@
           <a:p>
             <a:fld id="{37FD576D-CDDB-4BE3-B24E-0913864BC877}" type="datetimeFigureOut">
               <a:rPr lang="en-GB" smtClean="0"/>
-              <a:t>16/07/2025</a:t>
+              <a:t>17/07/2025</a:t>
             </a:fld>
             <a:endParaRPr lang="en-GB"/>
           </a:p>
@@ -1140,7 +1149,7 @@
           <a:p>
             <a:fld id="{37FD576D-CDDB-4BE3-B24E-0913864BC877}" type="datetimeFigureOut">
               <a:rPr lang="en-GB" smtClean="0"/>
-              <a:t>16/07/2025</a:t>
+              <a:t>17/07/2025</a:t>
             </a:fld>
             <a:endParaRPr lang="en-GB"/>
           </a:p>
@@ -1405,7 +1414,7 @@
           <a:p>
             <a:fld id="{37FD576D-CDDB-4BE3-B24E-0913864BC877}" type="datetimeFigureOut">
               <a:rPr lang="en-GB" smtClean="0"/>
-              <a:t>16/07/2025</a:t>
+              <a:t>17/07/2025</a:t>
             </a:fld>
             <a:endParaRPr lang="en-GB"/>
           </a:p>
@@ -1817,7 +1826,7 @@
           <a:p>
             <a:fld id="{37FD576D-CDDB-4BE3-B24E-0913864BC877}" type="datetimeFigureOut">
               <a:rPr lang="en-GB" smtClean="0"/>
-              <a:t>16/07/2025</a:t>
+              <a:t>17/07/2025</a:t>
             </a:fld>
             <a:endParaRPr lang="en-GB"/>
           </a:p>
@@ -1958,7 +1967,7 @@
           <a:p>
             <a:fld id="{37FD576D-CDDB-4BE3-B24E-0913864BC877}" type="datetimeFigureOut">
               <a:rPr lang="en-GB" smtClean="0"/>
-              <a:t>16/07/2025</a:t>
+              <a:t>17/07/2025</a:t>
             </a:fld>
             <a:endParaRPr lang="en-GB"/>
           </a:p>
@@ -2071,7 +2080,7 @@
           <a:p>
             <a:fld id="{37FD576D-CDDB-4BE3-B24E-0913864BC877}" type="datetimeFigureOut">
               <a:rPr lang="en-GB" smtClean="0"/>
-              <a:t>16/07/2025</a:t>
+              <a:t>17/07/2025</a:t>
             </a:fld>
             <a:endParaRPr lang="en-GB"/>
           </a:p>
@@ -2382,7 +2391,7 @@
           <a:p>
             <a:fld id="{37FD576D-CDDB-4BE3-B24E-0913864BC877}" type="datetimeFigureOut">
               <a:rPr lang="en-GB" smtClean="0"/>
-              <a:t>16/07/2025</a:t>
+              <a:t>17/07/2025</a:t>
             </a:fld>
             <a:endParaRPr lang="en-GB"/>
           </a:p>
@@ -2670,7 +2679,7 @@
           <a:p>
             <a:fld id="{37FD576D-CDDB-4BE3-B24E-0913864BC877}" type="datetimeFigureOut">
               <a:rPr lang="en-GB" smtClean="0"/>
-              <a:t>16/07/2025</a:t>
+              <a:t>17/07/2025</a:t>
             </a:fld>
             <a:endParaRPr lang="en-GB"/>
           </a:p>
@@ -2911,7 +2920,7 @@
           <a:p>
             <a:fld id="{37FD576D-CDDB-4BE3-B24E-0913864BC877}" type="datetimeFigureOut">
               <a:rPr lang="en-GB" smtClean="0"/>
-              <a:t>16/07/2025</a:t>
+              <a:t>17/07/2025</a:t>
             </a:fld>
             <a:endParaRPr lang="en-GB"/>
           </a:p>
@@ -3394,6 +3403,313 @@
 </p:sld>
 </file>
 
+<file path=ppt/slides/slide10.xml><?xml version="1.0" encoding="utf-8"?>
+<p:sld xmlns:a="http://schemas.openxmlformats.org/drawingml/2006/main" xmlns:r="http://schemas.openxmlformats.org/officeDocument/2006/relationships" xmlns:p="http://schemas.openxmlformats.org/presentationml/2006/main">
+  <p:cSld>
+    <p:spTree>
+      <p:nvGrpSpPr>
+        <p:cNvPr id="1" name=""/>
+        <p:cNvGrpSpPr/>
+        <p:nvPr/>
+      </p:nvGrpSpPr>
+      <p:grpSpPr>
+        <a:xfrm>
+          <a:off x="0" y="0"/>
+          <a:ext cx="0" cy="0"/>
+          <a:chOff x="0" y="0"/>
+          <a:chExt cx="0" cy="0"/>
+        </a:xfrm>
+      </p:grpSpPr>
+      <p:sp>
+        <p:nvSpPr>
+          <p:cNvPr id="2" name="Title 1">
+            <a:extLst>
+              <a:ext uri="{FF2B5EF4-FFF2-40B4-BE49-F238E27FC236}">
+                <a16:creationId xmlns:a16="http://schemas.microsoft.com/office/drawing/2014/main" id="{7363FC00-79FA-132C-B994-26ADFBE1B6D8}"/>
+              </a:ext>
+            </a:extLst>
+          </p:cNvPr>
+          <p:cNvSpPr>
+            <a:spLocks noGrp="1"/>
+          </p:cNvSpPr>
+          <p:nvPr>
+            <p:ph type="title"/>
+          </p:nvPr>
+        </p:nvSpPr>
+        <p:spPr/>
+        <p:txBody>
+          <a:bodyPr/>
+          <a:lstStyle/>
+          <a:p>
+            <a:endParaRPr lang="en-GB"/>
+          </a:p>
+        </p:txBody>
+      </p:sp>
+      <p:pic>
+        <p:nvPicPr>
+          <p:cNvPr id="5" name="Content Placeholder 4">
+            <a:extLst>
+              <a:ext uri="{FF2B5EF4-FFF2-40B4-BE49-F238E27FC236}">
+                <a16:creationId xmlns:a16="http://schemas.microsoft.com/office/drawing/2014/main" id="{F94F73A9-E7C6-21BE-B9C0-A8F64B1FBB3C}"/>
+              </a:ext>
+            </a:extLst>
+          </p:cNvPr>
+          <p:cNvPicPr>
+            <a:picLocks noGrp="1" noChangeAspect="1"/>
+          </p:cNvPicPr>
+          <p:nvPr>
+            <p:ph idx="1"/>
+          </p:nvPr>
+        </p:nvPicPr>
+        <p:blipFill>
+          <a:blip r:embed="rId2"/>
+          <a:stretch>
+            <a:fillRect/>
+          </a:stretch>
+        </p:blipFill>
+        <p:spPr>
+          <a:xfrm>
+            <a:off x="1283782" y="892995"/>
+            <a:ext cx="7268547" cy="5072009"/>
+          </a:xfrm>
+        </p:spPr>
+      </p:pic>
+    </p:spTree>
+    <p:extLst>
+      <p:ext uri="{BB962C8B-B14F-4D97-AF65-F5344CB8AC3E}">
+        <p14:creationId xmlns:p14="http://schemas.microsoft.com/office/powerpoint/2010/main" val="4160421620"/>
+      </p:ext>
+    </p:extLst>
+  </p:cSld>
+  <p:clrMapOvr>
+    <a:masterClrMapping/>
+  </p:clrMapOvr>
+</p:sld>
+</file>
+
+<file path=ppt/slides/slide11.xml><?xml version="1.0" encoding="utf-8"?>
+<p:sld xmlns:a="http://schemas.openxmlformats.org/drawingml/2006/main" xmlns:r="http://schemas.openxmlformats.org/officeDocument/2006/relationships" xmlns:p="http://schemas.openxmlformats.org/presentationml/2006/main">
+  <p:cSld>
+    <p:spTree>
+      <p:nvGrpSpPr>
+        <p:cNvPr id="1" name=""/>
+        <p:cNvGrpSpPr/>
+        <p:nvPr/>
+      </p:nvGrpSpPr>
+      <p:grpSpPr>
+        <a:xfrm>
+          <a:off x="0" y="0"/>
+          <a:ext cx="0" cy="0"/>
+          <a:chOff x="0" y="0"/>
+          <a:chExt cx="0" cy="0"/>
+        </a:xfrm>
+      </p:grpSpPr>
+      <p:sp>
+        <p:nvSpPr>
+          <p:cNvPr id="2" name="Title 1">
+            <a:extLst>
+              <a:ext uri="{FF2B5EF4-FFF2-40B4-BE49-F238E27FC236}">
+                <a16:creationId xmlns:a16="http://schemas.microsoft.com/office/drawing/2014/main" id="{92B781CF-9A70-6765-57EB-9E0DFC73F0D0}"/>
+              </a:ext>
+            </a:extLst>
+          </p:cNvPr>
+          <p:cNvSpPr>
+            <a:spLocks noGrp="1"/>
+          </p:cNvSpPr>
+          <p:nvPr>
+            <p:ph type="title"/>
+          </p:nvPr>
+        </p:nvSpPr>
+        <p:spPr/>
+        <p:txBody>
+          <a:bodyPr/>
+          <a:lstStyle/>
+          <a:p>
+            <a:endParaRPr lang="en-GB" dirty="0"/>
+          </a:p>
+        </p:txBody>
+      </p:sp>
+      <p:sp>
+        <p:nvSpPr>
+          <p:cNvPr id="3" name="Content Placeholder 2">
+            <a:extLst>
+              <a:ext uri="{FF2B5EF4-FFF2-40B4-BE49-F238E27FC236}">
+                <a16:creationId xmlns:a16="http://schemas.microsoft.com/office/drawing/2014/main" id="{AE08B091-63C7-FCCE-7C49-AC1DAA583304}"/>
+              </a:ext>
+            </a:extLst>
+          </p:cNvPr>
+          <p:cNvSpPr>
+            <a:spLocks noGrp="1"/>
+          </p:cNvSpPr>
+          <p:nvPr>
+            <p:ph idx="1"/>
+          </p:nvPr>
+        </p:nvSpPr>
+        <p:spPr>
+          <a:xfrm>
+            <a:off x="8148918" y="365125"/>
+            <a:ext cx="3204882" cy="5811838"/>
+          </a:xfrm>
+        </p:spPr>
+        <p:txBody>
+          <a:bodyPr/>
+          <a:lstStyle/>
+          <a:p>
+            <a:pPr marL="0" indent="0">
+              <a:buNone/>
+            </a:pPr>
+            <a:r>
+              <a:rPr lang="en-GB" dirty="0"/>
+              <a:t>Password </a:t>
+            </a:r>
+          </a:p>
+          <a:p>
+            <a:pPr marL="0" indent="0">
+              <a:buNone/>
+            </a:pPr>
+            <a:r>
+              <a:rPr lang="en-GB" dirty="0"/>
+              <a:t>changeme!12</a:t>
+            </a:r>
+          </a:p>
+          <a:p>
+            <a:pPr marL="0" indent="0">
+              <a:buNone/>
+            </a:pPr>
+            <a:r>
+              <a:rPr lang="en-GB" dirty="0"/>
+              <a:t>changeme!12</a:t>
+            </a:r>
+          </a:p>
+        </p:txBody>
+      </p:sp>
+      <p:pic>
+        <p:nvPicPr>
+          <p:cNvPr id="7" name="Picture 6">
+            <a:extLst>
+              <a:ext uri="{FF2B5EF4-FFF2-40B4-BE49-F238E27FC236}">
+                <a16:creationId xmlns:a16="http://schemas.microsoft.com/office/drawing/2014/main" id="{272E25F4-D41C-0659-DED1-175DE96B755F}"/>
+              </a:ext>
+            </a:extLst>
+          </p:cNvPr>
+          <p:cNvPicPr>
+            <a:picLocks noChangeAspect="1"/>
+          </p:cNvPicPr>
+          <p:nvPr/>
+        </p:nvPicPr>
+        <p:blipFill>
+          <a:blip r:embed="rId2"/>
+          <a:stretch>
+            <a:fillRect/>
+          </a:stretch>
+        </p:blipFill>
+        <p:spPr>
+          <a:xfrm>
+            <a:off x="628683" y="365125"/>
+            <a:ext cx="6158141" cy="5056094"/>
+          </a:xfrm>
+          <a:prstGeom prst="rect">
+            <a:avLst/>
+          </a:prstGeom>
+        </p:spPr>
+      </p:pic>
+    </p:spTree>
+    <p:extLst>
+      <p:ext uri="{BB962C8B-B14F-4D97-AF65-F5344CB8AC3E}">
+        <p14:creationId xmlns:p14="http://schemas.microsoft.com/office/powerpoint/2010/main" val="12238621"/>
+      </p:ext>
+    </p:extLst>
+  </p:cSld>
+  <p:clrMapOvr>
+    <a:masterClrMapping/>
+  </p:clrMapOvr>
+</p:sld>
+</file>
+
+<file path=ppt/slides/slide12.xml><?xml version="1.0" encoding="utf-8"?>
+<p:sld xmlns:a="http://schemas.openxmlformats.org/drawingml/2006/main" xmlns:r="http://schemas.openxmlformats.org/officeDocument/2006/relationships" xmlns:p="http://schemas.openxmlformats.org/presentationml/2006/main">
+  <p:cSld>
+    <p:spTree>
+      <p:nvGrpSpPr>
+        <p:cNvPr id="1" name=""/>
+        <p:cNvGrpSpPr/>
+        <p:nvPr/>
+      </p:nvGrpSpPr>
+      <p:grpSpPr>
+        <a:xfrm>
+          <a:off x="0" y="0"/>
+          <a:ext cx="0" cy="0"/>
+          <a:chOff x="0" y="0"/>
+          <a:chExt cx="0" cy="0"/>
+        </a:xfrm>
+      </p:grpSpPr>
+      <p:sp>
+        <p:nvSpPr>
+          <p:cNvPr id="2" name="Title 1">
+            <a:extLst>
+              <a:ext uri="{FF2B5EF4-FFF2-40B4-BE49-F238E27FC236}">
+                <a16:creationId xmlns:a16="http://schemas.microsoft.com/office/drawing/2014/main" id="{0066BA0E-B97D-1FF0-D7D7-DB8123C5644E}"/>
+              </a:ext>
+            </a:extLst>
+          </p:cNvPr>
+          <p:cNvSpPr>
+            <a:spLocks noGrp="1"/>
+          </p:cNvSpPr>
+          <p:nvPr>
+            <p:ph type="title"/>
+          </p:nvPr>
+        </p:nvSpPr>
+        <p:spPr/>
+        <p:txBody>
+          <a:bodyPr/>
+          <a:lstStyle/>
+          <a:p>
+            <a:endParaRPr lang="en-GB"/>
+          </a:p>
+        </p:txBody>
+      </p:sp>
+      <p:pic>
+        <p:nvPicPr>
+          <p:cNvPr id="5" name="Content Placeholder 4">
+            <a:extLst>
+              <a:ext uri="{FF2B5EF4-FFF2-40B4-BE49-F238E27FC236}">
+                <a16:creationId xmlns:a16="http://schemas.microsoft.com/office/drawing/2014/main" id="{94DCDD1F-EE15-4C11-291D-5317A3A3342E}"/>
+              </a:ext>
+            </a:extLst>
+          </p:cNvPr>
+          <p:cNvPicPr>
+            <a:picLocks noGrp="1" noChangeAspect="1"/>
+          </p:cNvPicPr>
+          <p:nvPr>
+            <p:ph idx="1"/>
+          </p:nvPr>
+        </p:nvPicPr>
+        <p:blipFill>
+          <a:blip r:embed="rId2"/>
+          <a:stretch>
+            <a:fillRect/>
+          </a:stretch>
+        </p:blipFill>
+        <p:spPr>
+          <a:xfrm>
+            <a:off x="838200" y="722965"/>
+            <a:ext cx="6760004" cy="5032375"/>
+          </a:xfrm>
+        </p:spPr>
+      </p:pic>
+    </p:spTree>
+    <p:extLst>
+      <p:ext uri="{BB962C8B-B14F-4D97-AF65-F5344CB8AC3E}">
+        <p14:creationId xmlns:p14="http://schemas.microsoft.com/office/powerpoint/2010/main" val="237074492"/>
+      </p:ext>
+    </p:extLst>
+  </p:cSld>
+  <p:clrMapOvr>
+    <a:masterClrMapping/>
+  </p:clrMapOvr>
+</p:sld>
+</file>
+
 <file path=ppt/slides/slide2.xml><?xml version="1.0" encoding="utf-8"?>
 <p:sld xmlns:a="http://schemas.openxmlformats.org/drawingml/2006/main" xmlns:r="http://schemas.openxmlformats.org/officeDocument/2006/relationships" xmlns:p="http://schemas.openxmlformats.org/presentationml/2006/main">
   <p:cSld>
@@ -4101,9 +4417,23 @@
           <a:lstStyle/>
           <a:p>
             <a:r>
-              <a:rPr lang="en-GB"/>
+              <a:rPr lang="en-GB" dirty="0"/>
               <a:t>Successful installation</a:t>
             </a:r>
+          </a:p>
+          <a:p>
+            <a:r>
+              <a:rPr lang="en-GB" dirty="0"/>
+              <a:t>Second version of was installed that had a </a:t>
+            </a:r>
+            <a:r>
+              <a:rPr lang="en-GB" dirty="0" err="1"/>
+              <a:t>gui</a:t>
+            </a:r>
+            <a:endParaRPr lang="en-GB" dirty="0"/>
+          </a:p>
+          <a:p>
+            <a:endParaRPr lang="en-GB" dirty="0"/>
           </a:p>
         </p:txBody>
       </p:sp>
@@ -4228,10 +4558,124 @@
           </a:p>
         </p:txBody>
       </p:sp>
+      <p:pic>
+        <p:nvPicPr>
+          <p:cNvPr id="5" name="Picture 4">
+            <a:extLst>
+              <a:ext uri="{FF2B5EF4-FFF2-40B4-BE49-F238E27FC236}">
+                <a16:creationId xmlns:a16="http://schemas.microsoft.com/office/drawing/2014/main" id="{7B07BD8D-9201-4691-BD8B-94524494282A}"/>
+              </a:ext>
+            </a:extLst>
+          </p:cNvPr>
+          <p:cNvPicPr>
+            <a:picLocks noChangeAspect="1"/>
+          </p:cNvPicPr>
+          <p:nvPr/>
+        </p:nvPicPr>
+        <p:blipFill>
+          <a:blip r:embed="rId2"/>
+          <a:stretch>
+            <a:fillRect/>
+          </a:stretch>
+        </p:blipFill>
+        <p:spPr>
+          <a:xfrm>
+            <a:off x="1209000" y="0"/>
+            <a:ext cx="8283013" cy="5811838"/>
+          </a:xfrm>
+          <a:prstGeom prst="rect">
+            <a:avLst/>
+          </a:prstGeom>
+        </p:spPr>
+      </p:pic>
     </p:spTree>
     <p:extLst>
       <p:ext uri="{BB962C8B-B14F-4D97-AF65-F5344CB8AC3E}">
         <p14:creationId xmlns:p14="http://schemas.microsoft.com/office/powerpoint/2010/main" val="3821136593"/>
+      </p:ext>
+    </p:extLst>
+  </p:cSld>
+  <p:clrMapOvr>
+    <a:masterClrMapping/>
+  </p:clrMapOvr>
+</p:sld>
+</file>
+
+<file path=ppt/slides/slide9.xml><?xml version="1.0" encoding="utf-8"?>
+<p:sld xmlns:a="http://schemas.openxmlformats.org/drawingml/2006/main" xmlns:r="http://schemas.openxmlformats.org/officeDocument/2006/relationships" xmlns:p="http://schemas.openxmlformats.org/presentationml/2006/main">
+  <p:cSld>
+    <p:spTree>
+      <p:nvGrpSpPr>
+        <p:cNvPr id="1" name=""/>
+        <p:cNvGrpSpPr/>
+        <p:nvPr/>
+      </p:nvGrpSpPr>
+      <p:grpSpPr>
+        <a:xfrm>
+          <a:off x="0" y="0"/>
+          <a:ext cx="0" cy="0"/>
+          <a:chOff x="0" y="0"/>
+          <a:chExt cx="0" cy="0"/>
+        </a:xfrm>
+      </p:grpSpPr>
+      <p:sp>
+        <p:nvSpPr>
+          <p:cNvPr id="2" name="Title 1">
+            <a:extLst>
+              <a:ext uri="{FF2B5EF4-FFF2-40B4-BE49-F238E27FC236}">
+                <a16:creationId xmlns:a16="http://schemas.microsoft.com/office/drawing/2014/main" id="{8AA36A35-16D1-9415-6690-A4AD57D6507F}"/>
+              </a:ext>
+            </a:extLst>
+          </p:cNvPr>
+          <p:cNvSpPr>
+            <a:spLocks noGrp="1"/>
+          </p:cNvSpPr>
+          <p:nvPr>
+            <p:ph type="title"/>
+          </p:nvPr>
+        </p:nvSpPr>
+        <p:spPr/>
+        <p:txBody>
+          <a:bodyPr/>
+          <a:lstStyle/>
+          <a:p>
+            <a:endParaRPr lang="en-GB"/>
+          </a:p>
+        </p:txBody>
+      </p:sp>
+      <p:pic>
+        <p:nvPicPr>
+          <p:cNvPr id="5" name="Content Placeholder 4">
+            <a:extLst>
+              <a:ext uri="{FF2B5EF4-FFF2-40B4-BE49-F238E27FC236}">
+                <a16:creationId xmlns:a16="http://schemas.microsoft.com/office/drawing/2014/main" id="{767510AE-05AC-0F3F-4FD3-F7970D535EE9}"/>
+              </a:ext>
+            </a:extLst>
+          </p:cNvPr>
+          <p:cNvPicPr>
+            <a:picLocks noGrp="1" noChangeAspect="1"/>
+          </p:cNvPicPr>
+          <p:nvPr>
+            <p:ph idx="1"/>
+          </p:nvPr>
+        </p:nvPicPr>
+        <p:blipFill>
+          <a:blip r:embed="rId2"/>
+          <a:stretch>
+            <a:fillRect/>
+          </a:stretch>
+        </p:blipFill>
+        <p:spPr>
+          <a:xfrm>
+            <a:off x="838200" y="365125"/>
+            <a:ext cx="8796546" cy="6127750"/>
+          </a:xfrm>
+        </p:spPr>
+      </p:pic>
+    </p:spTree>
+    <p:extLst>
+      <p:ext uri="{BB962C8B-B14F-4D97-AF65-F5344CB8AC3E}">
+        <p14:creationId xmlns:p14="http://schemas.microsoft.com/office/powerpoint/2010/main" val="1044635071"/>
       </p:ext>
     </p:extLst>
   </p:cSld>

</xml_diff>